<commit_message>
Added Projektarbeit titel on Title slide
</commit_message>
<xml_diff>
--- a/Praesentationen/Audio-Deepfakes.pptx
+++ b/Praesentationen/Audio-Deepfakes.pptx
@@ -2945,29 +2945,6 @@
       </p:grpSpPr>
       <p:sp>
         <p:nvSpPr>
-          <p:cNvPr id="4101" name="Rectangle 2"/>
-          <p:cNvSpPr>
-            <a:spLocks noGrp="1" noChangeArrowheads="1"/>
-          </p:cNvSpPr>
-          <p:nvPr>
-            <p:ph type="ctrTitle"/>
-          </p:nvPr>
-        </p:nvSpPr>
-        <p:spPr/>
-        <p:txBody>
-          <a:bodyPr/>
-          <a:lstStyle/>
-          <a:p>
-            <a:pPr eaLnBrk="1" hangingPunct="1"/>
-            <a:r>
-              <a:rPr lang="de-DE" dirty="0"/>
-              <a:t>Audio Deepfakes</a:t>
-            </a:r>
-          </a:p>
-        </p:txBody>
-      </p:sp>
-      <p:sp>
-        <p:nvSpPr>
           <p:cNvPr id="4102" name="Rectangle 3"/>
           <p:cNvSpPr>
             <a:spLocks noGrp="1" noChangeArrowheads="1"/>
@@ -2988,6 +2965,64 @@
               <a:rPr lang="de-DE" dirty="0"/>
               <a:t>Julian Faigle, Max Ernstschneider</a:t>
             </a:r>
+          </a:p>
+        </p:txBody>
+      </p:sp>
+      <p:sp>
+        <p:nvSpPr>
+          <p:cNvPr id="7" name="Rectangle 2">
+            <a:extLst>
+              <a:ext uri="{FF2B5EF4-FFF2-40B4-BE49-F238E27FC236}">
+                <a16:creationId xmlns:a16="http://schemas.microsoft.com/office/drawing/2014/main" id="{66274E4B-6AD1-4468-8295-E574D3C11098}"/>
+              </a:ext>
+            </a:extLst>
+          </p:cNvPr>
+          <p:cNvSpPr>
+            <a:spLocks noGrp="1" noChangeArrowheads="1"/>
+          </p:cNvSpPr>
+          <p:nvPr>
+            <p:ph type="ctrTitle"/>
+          </p:nvPr>
+        </p:nvSpPr>
+        <p:spPr>
+          <a:xfrm>
+            <a:off x="2420938" y="1782763"/>
+            <a:ext cx="9015412" cy="2219325"/>
+          </a:xfrm>
+        </p:spPr>
+        <p:txBody>
+          <a:bodyPr>
+            <a:normAutofit fontScale="90000"/>
+          </a:bodyPr>
+          <a:lstStyle/>
+          <a:p>
+            <a:pPr eaLnBrk="1" hangingPunct="1"/>
+            <a:r>
+              <a:rPr lang="de-DE" dirty="0"/>
+              <a:t>Audio Deepfakes</a:t>
+            </a:r>
+            <a:br>
+              <a:rPr lang="de-DE" dirty="0"/>
+            </a:br>
+            <a:br>
+              <a:rPr lang="de-DE" dirty="0"/>
+            </a:br>
+            <a:br>
+              <a:rPr lang="de-DE" dirty="0"/>
+            </a:br>
+            <a:r>
+              <a:rPr lang="de-DE" sz="2000" dirty="0"/>
+              <a:t>Projektarbeit: Deepfakes und </a:t>
+            </a:r>
+            <a:r>
+              <a:rPr lang="de-DE" sz="2000" dirty="0" err="1"/>
+              <a:t>Social</a:t>
+            </a:r>
+            <a:r>
+              <a:rPr lang="de-DE" sz="2000" dirty="0"/>
+              <a:t> Engineering</a:t>
+            </a:r>
+            <a:endParaRPr lang="de-DE" dirty="0"/>
           </a:p>
         </p:txBody>
       </p:sp>

</xml_diff>